<commit_message>
Added in powerpoint changes from Alex
</commit_message>
<xml_diff>
--- a/doc/winter_quarter_presentation.pptx
+++ b/doc/winter_quarter_presentation.pptx
@@ -369,7 +369,7 @@
     </p:spTree>
     <p:extLst>
       <p:ext uri="{BB962C8B-B14F-4D97-AF65-F5344CB8AC3E}">
-        <p14:creationId xmlns:p14="http://schemas.microsoft.com/office/powerpoint/2010/main" xmlns="" val="154004659"/>
+        <p14:creationId xmlns:p14="http://schemas.microsoft.com/office/powerpoint/2010/main" val="154004659"/>
       </p:ext>
     </p:extLst>
   </p:cSld>
@@ -525,11 +525,7 @@
           <a:p>
             <a:r>
               <a:rPr lang="en-US" baseline="0" dirty="0" smtClean="0"/>
-              <a:t>Will talk about algorithms </a:t>
-            </a:r>
-            <a:r>
-              <a:rPr lang="en-US" baseline="0" dirty="0" smtClean="0"/>
-              <a:t>later</a:t>
+              <a:t>Will talk about algorithms later</a:t>
             </a:r>
           </a:p>
           <a:p>
@@ -596,7 +592,7 @@
     </p:spTree>
     <p:extLst>
       <p:ext uri="{BB962C8B-B14F-4D97-AF65-F5344CB8AC3E}">
-        <p14:creationId xmlns:p14="http://schemas.microsoft.com/office/powerpoint/2010/main" xmlns="" val="88864018"/>
+        <p14:creationId xmlns:p14="http://schemas.microsoft.com/office/powerpoint/2010/main" val="88864018"/>
       </p:ext>
     </p:extLst>
   </p:cSld>
@@ -656,11 +652,7 @@
             </a:r>
             <a:r>
               <a:rPr lang="en-US" baseline="0" dirty="0" smtClean="0"/>
-              <a:t> flow for clients (how it’s used</a:t>
-            </a:r>
-            <a:r>
-              <a:rPr lang="en-US" baseline="0" dirty="0" smtClean="0"/>
-              <a:t>)</a:t>
+              <a:t> flow for clients (how it’s used)</a:t>
             </a:r>
           </a:p>
           <a:p>
@@ -713,7 +705,7 @@
     </p:spTree>
     <p:extLst>
       <p:ext uri="{BB962C8B-B14F-4D97-AF65-F5344CB8AC3E}">
-        <p14:creationId xmlns:p14="http://schemas.microsoft.com/office/powerpoint/2010/main" xmlns="" val="2670760965"/>
+        <p14:creationId xmlns:p14="http://schemas.microsoft.com/office/powerpoint/2010/main" val="2670760965"/>
       </p:ext>
     </p:extLst>
   </p:cSld>
@@ -806,7 +798,92 @@
     </p:spTree>
     <p:extLst>
       <p:ext uri="{BB962C8B-B14F-4D97-AF65-F5344CB8AC3E}">
-        <p14:creationId xmlns:p14="http://schemas.microsoft.com/office/powerpoint/2010/main" xmlns="" val="2612294640"/>
+        <p14:creationId xmlns:p14="http://schemas.microsoft.com/office/powerpoint/2010/main" val="2612294640"/>
+      </p:ext>
+    </p:extLst>
+  </p:cSld>
+  <p:clrMapOvr>
+    <a:masterClrMapping/>
+  </p:clrMapOvr>
+</p:notes>
+</file>
+
+<file path=ppt/notesSlides/notesSlide4.xml><?xml version="1.0" encoding="utf-8"?>
+<p:notes xmlns:a="http://schemas.openxmlformats.org/drawingml/2006/main" xmlns:r="http://schemas.openxmlformats.org/officeDocument/2006/relationships" xmlns:p="http://schemas.openxmlformats.org/presentationml/2006/main">
+  <p:cSld>
+    <p:spTree>
+      <p:nvGrpSpPr>
+        <p:cNvPr id="1" name=""/>
+        <p:cNvGrpSpPr/>
+        <p:nvPr/>
+      </p:nvGrpSpPr>
+      <p:grpSpPr>
+        <a:xfrm>
+          <a:off x="0" y="0"/>
+          <a:ext cx="0" cy="0"/>
+          <a:chOff x="0" y="0"/>
+          <a:chExt cx="0" cy="0"/>
+        </a:xfrm>
+      </p:grpSpPr>
+      <p:sp>
+        <p:nvSpPr>
+          <p:cNvPr id="2" name="Slide Image Placeholder 1"/>
+          <p:cNvSpPr>
+            <a:spLocks noGrp="1" noRot="1" noChangeAspect="1"/>
+          </p:cNvSpPr>
+          <p:nvPr>
+            <p:ph type="sldImg"/>
+          </p:nvPr>
+        </p:nvSpPr>
+        <p:spPr/>
+      </p:sp>
+      <p:sp>
+        <p:nvSpPr>
+          <p:cNvPr id="3" name="Notes Placeholder 2"/>
+          <p:cNvSpPr>
+            <a:spLocks noGrp="1"/>
+          </p:cNvSpPr>
+          <p:nvPr>
+            <p:ph type="body" idx="1"/>
+          </p:nvPr>
+        </p:nvSpPr>
+        <p:spPr/>
+        <p:txBody>
+          <a:bodyPr/>
+          <a:lstStyle/>
+          <a:p>
+            <a:endParaRPr lang="en-US" dirty="0"/>
+          </a:p>
+        </p:txBody>
+      </p:sp>
+      <p:sp>
+        <p:nvSpPr>
+          <p:cNvPr id="4" name="Slide Number Placeholder 3"/>
+          <p:cNvSpPr>
+            <a:spLocks noGrp="1"/>
+          </p:cNvSpPr>
+          <p:nvPr>
+            <p:ph type="sldNum" sz="quarter" idx="10"/>
+          </p:nvPr>
+        </p:nvSpPr>
+        <p:spPr/>
+        <p:txBody>
+          <a:bodyPr/>
+          <a:lstStyle/>
+          <a:p>
+            <a:fld id="{4B63FCE5-717F-3B46-A69D-B8B1230B7F2F}" type="slidenum">
+              <a:rPr lang="en-US" smtClean="0"/>
+              <a:pPr/>
+              <a:t>7</a:t>
+            </a:fld>
+            <a:endParaRPr lang="en-US"/>
+          </a:p>
+        </p:txBody>
+      </p:sp>
+    </p:spTree>
+    <p:extLst>
+      <p:ext uri="{BB962C8B-B14F-4D97-AF65-F5344CB8AC3E}">
+        <p14:creationId xmlns:p14="http://schemas.microsoft.com/office/powerpoint/2010/main" val="886806660"/>
       </p:ext>
     </p:extLst>
   </p:cSld>
@@ -4283,7 +4360,7 @@
     </p:spTree>
     <p:extLst>
       <p:ext uri="{BB962C8B-B14F-4D97-AF65-F5344CB8AC3E}">
-        <p14:creationId xmlns:p14="http://schemas.microsoft.com/office/powerpoint/2010/main" xmlns="" val="896442764"/>
+        <p14:creationId xmlns:p14="http://schemas.microsoft.com/office/powerpoint/2010/main" val="896442764"/>
       </p:ext>
     </p:extLst>
   </p:cSld>
@@ -4405,7 +4482,7 @@
     </p:spTree>
     <p:extLst>
       <p:ext uri="{BB962C8B-B14F-4D97-AF65-F5344CB8AC3E}">
-        <p14:creationId xmlns:p14="http://schemas.microsoft.com/office/powerpoint/2010/main" xmlns="" val="3869748282"/>
+        <p14:creationId xmlns:p14="http://schemas.microsoft.com/office/powerpoint/2010/main" val="3869748282"/>
       </p:ext>
     </p:extLst>
   </p:cSld>
@@ -4479,10 +4556,10 @@
           </p:nvPr>
         </p:nvPicPr>
         <p:blipFill>
-          <a:blip r:embed="rId3" cstate="print">
+          <a:blip r:embed="rId3" cstate="email">
             <a:extLst>
               <a:ext uri="{28A0092B-C50C-407E-A947-70E740481C1C}">
-                <a14:useLocalDpi xmlns:a14="http://schemas.microsoft.com/office/drawing/2010/main" xmlns="" val="0"/>
+                <a14:useLocalDpi xmlns:a14="http://schemas.microsoft.com/office/drawing/2010/main" val="0"/>
               </a:ext>
             </a:extLst>
           </a:blip>
@@ -4504,7 +4581,7 @@
     </p:spTree>
     <p:extLst>
       <p:ext uri="{BB962C8B-B14F-4D97-AF65-F5344CB8AC3E}">
-        <p14:creationId xmlns:p14="http://schemas.microsoft.com/office/powerpoint/2010/main" xmlns="" val="1301957777"/>
+        <p14:creationId xmlns:p14="http://schemas.microsoft.com/office/powerpoint/2010/main" val="1301957777"/>
       </p:ext>
     </p:extLst>
   </p:cSld>
@@ -4651,7 +4728,7 @@
     </p:spTree>
     <p:extLst>
       <p:ext uri="{BB962C8B-B14F-4D97-AF65-F5344CB8AC3E}">
-        <p14:creationId xmlns:p14="http://schemas.microsoft.com/office/powerpoint/2010/main" xmlns="" val="162784289"/>
+        <p14:creationId xmlns:p14="http://schemas.microsoft.com/office/powerpoint/2010/main" val="162784289"/>
       </p:ext>
     </p:extLst>
   </p:cSld>
@@ -4728,7 +4805,7 @@
           <a:blip r:embed="rId2" cstate="print">
             <a:extLst>
               <a:ext uri="{28A0092B-C50C-407E-A947-70E740481C1C}">
-                <a14:useLocalDpi xmlns:a14="http://schemas.microsoft.com/office/drawing/2010/main" xmlns="" val="0"/>
+                <a14:useLocalDpi xmlns:a14="http://schemas.microsoft.com/office/drawing/2010/main" val="0"/>
               </a:ext>
             </a:extLst>
           </a:blip>
@@ -4747,7 +4824,7 @@
     </p:spTree>
     <p:extLst>
       <p:ext uri="{BB962C8B-B14F-4D97-AF65-F5344CB8AC3E}">
-        <p14:creationId xmlns:p14="http://schemas.microsoft.com/office/powerpoint/2010/main" xmlns="" val="3320568816"/>
+        <p14:creationId xmlns:p14="http://schemas.microsoft.com/office/powerpoint/2010/main" val="3320568816"/>
       </p:ext>
     </p:extLst>
   </p:cSld>
@@ -4799,7 +4876,7 @@
             <a:pPr algn="ctr"/>
             <a:r>
               <a:rPr lang="en-US" cap="none" dirty="0" smtClean="0"/>
-              <a:t>Algorithms (change slide)</a:t>
+              <a:t>Image Recognition</a:t>
             </a:r>
             <a:endParaRPr lang="en-US" cap="none" dirty="0"/>
           </a:p>
@@ -4820,14 +4897,96 @@
           <a:bodyPr/>
           <a:lstStyle/>
           <a:p>
-            <a:endParaRPr lang="en-US" dirty="0"/>
+            <a:r>
+              <a:rPr lang="en-US" dirty="0" smtClean="0"/>
+              <a:t>Transform angled photo to flat—simple matrix transform</a:t>
+            </a:r>
+          </a:p>
+          <a:p>
+            <a:endParaRPr lang="en-US" dirty="0"/>
+          </a:p>
+          <a:p>
+            <a:r>
+              <a:rPr lang="en-US" dirty="0" smtClean="0"/>
+              <a:t>Currently using </a:t>
+            </a:r>
+            <a:r>
+              <a:rPr lang="en-US" dirty="0" err="1" smtClean="0"/>
+              <a:t>Laplacian</a:t>
+            </a:r>
+            <a:r>
+              <a:rPr lang="en-US" dirty="0" smtClean="0"/>
+              <a:t> of Gaussian to find dots</a:t>
+            </a:r>
+          </a:p>
+          <a:p>
+            <a:pPr lvl="1"/>
+            <a:r>
+              <a:rPr lang="en-US" dirty="0" smtClean="0"/>
+              <a:t>Make the image grayscale, then find regions with abnormally low areas of light</a:t>
+            </a:r>
+          </a:p>
+          <a:p>
+            <a:pPr lvl="1"/>
+            <a:r>
+              <a:rPr lang="en-US" dirty="0" smtClean="0"/>
+              <a:t>Check to see if </a:t>
+            </a:r>
+            <a:r>
+              <a:rPr lang="en-US" smtClean="0"/>
+              <a:t>they’re dot-shaped. </a:t>
+            </a:r>
+            <a:endParaRPr lang="en-US" dirty="0" smtClean="0"/>
+          </a:p>
+          <a:p>
+            <a:endParaRPr lang="en-US" dirty="0"/>
+          </a:p>
+          <a:p>
+            <a:r>
+              <a:rPr lang="en-US" dirty="0" smtClean="0"/>
+              <a:t>Investigating Lindberg’s algorithm for more robust </a:t>
+            </a:r>
+            <a:r>
+              <a:rPr lang="en-US" dirty="0"/>
+              <a:t>blob </a:t>
+            </a:r>
+            <a:r>
+              <a:rPr lang="en-US" dirty="0" smtClean="0"/>
+              <a:t>recognition, from </a:t>
+            </a:r>
+            <a:r>
+              <a:rPr lang="en-US" dirty="0"/>
+              <a:t>“Discrete Scale-Space Theory and the Scale-Space Primal </a:t>
+            </a:r>
+            <a:r>
+              <a:rPr lang="en-US" dirty="0" smtClean="0"/>
+              <a:t>Sketch”</a:t>
+            </a:r>
+          </a:p>
+          <a:p>
+            <a:endParaRPr lang="en-US" dirty="0"/>
+          </a:p>
+          <a:p>
+            <a:endParaRPr lang="en-US" dirty="0" smtClean="0"/>
+          </a:p>
+          <a:p>
+            <a:endParaRPr lang="en-US" dirty="0"/>
+          </a:p>
+          <a:p>
+            <a:endParaRPr lang="en-US" dirty="0"/>
+          </a:p>
+          <a:p>
+            <a:endParaRPr lang="en-US" dirty="0"/>
+          </a:p>
+          <a:p>
+            <a:endParaRPr lang="en-US" dirty="0" smtClean="0"/>
           </a:p>
         </p:txBody>
       </p:sp>
     </p:spTree>
     <p:extLst>
       <p:ext uri="{BB962C8B-B14F-4D97-AF65-F5344CB8AC3E}">
-        <p14:creationId xmlns:p14="http://schemas.microsoft.com/office/powerpoint/2010/main" xmlns="" val="924730003"/>
+        <p14:creationId xmlns:p14="http://schemas.microsoft.com/office/powerpoint/2010/main" val="924730003"/>
       </p:ext>
     </p:extLst>
   </p:cSld>
@@ -4879,7 +5038,7 @@
             <a:pPr algn="ctr"/>
             <a:r>
               <a:rPr lang="en-US" cap="none" dirty="0" smtClean="0"/>
-              <a:t>Algorithms (change slide)</a:t>
+              <a:t>Statistics	</a:t>
             </a:r>
             <a:endParaRPr lang="en-US" cap="none" dirty="0"/>
           </a:p>
@@ -4900,14 +5059,123 @@
           <a:bodyPr/>
           <a:lstStyle/>
           <a:p>
-            <a:endParaRPr lang="en-US" dirty="0"/>
-          </a:p>
-        </p:txBody>
-      </p:sp>
+            <a:r>
+              <a:rPr lang="en-US" dirty="0" smtClean="0"/>
+              <a:t>Chi-squared for single-cluster analysis</a:t>
+            </a:r>
+          </a:p>
+          <a:p>
+            <a:pPr lvl="1"/>
+            <a:r>
+              <a:rPr lang="en-US" dirty="0" smtClean="0"/>
+              <a:t>Linearity unimportant</a:t>
+            </a:r>
+            <a:br>
+              <a:rPr lang="en-US" dirty="0" smtClean="0"/>
+            </a:br>
+            <a:endParaRPr lang="en-US" dirty="0" smtClean="0"/>
+          </a:p>
+          <a:p>
+            <a:r>
+              <a:rPr lang="en-US" dirty="0" smtClean="0"/>
+              <a:t>OPTICS to find multiple clusters</a:t>
+            </a:r>
+            <a:br>
+              <a:rPr lang="en-US" dirty="0" smtClean="0"/>
+            </a:br>
+            <a:endParaRPr lang="en-US" dirty="0" smtClean="0"/>
+          </a:p>
+          <a:p>
+            <a:r>
+              <a:rPr lang="en-US" dirty="0" smtClean="0"/>
+              <a:t>Potential for time-based linear regressions on</a:t>
+            </a:r>
+          </a:p>
+          <a:p>
+            <a:pPr marL="0" indent="0">
+              <a:buNone/>
+            </a:pPr>
+            <a:r>
+              <a:rPr lang="en-US" dirty="0" smtClean="0"/>
+              <a:t>       users’ progress over time</a:t>
+            </a:r>
+          </a:p>
+          <a:p>
+            <a:pPr marL="0" indent="0">
+              <a:buNone/>
+            </a:pPr>
+            <a:endParaRPr lang="en-US" dirty="0" smtClean="0"/>
+          </a:p>
+          <a:p>
+            <a:endParaRPr lang="en-US" b="1" dirty="0"/>
+          </a:p>
+        </p:txBody>
+      </p:sp>
+      <p:pic>
+        <p:nvPicPr>
+          <p:cNvPr id="1026" name="Picture 2"/>
+          <p:cNvPicPr>
+            <a:picLocks noChangeAspect="1" noChangeArrowheads="1"/>
+          </p:cNvPicPr>
+          <p:nvPr/>
+        </p:nvPicPr>
+        <p:blipFill>
+          <a:blip r:embed="rId3">
+            <a:extLst>
+              <a:ext uri="{28A0092B-C50C-407E-A947-70E740481C1C}">
+                <a14:useLocalDpi xmlns:a14="http://schemas.microsoft.com/office/drawing/2010/main" val="0"/>
+              </a:ext>
+            </a:extLst>
+          </a:blip>
+          <a:srcRect/>
+          <a:stretch>
+            <a:fillRect/>
+          </a:stretch>
+        </p:blipFill>
+        <p:spPr bwMode="auto">
+          <a:xfrm>
+            <a:off x="5545455" y="2284095"/>
+            <a:ext cx="3333750" cy="3248025"/>
+          </a:xfrm>
+          <a:prstGeom prst="rect">
+            <a:avLst/>
+          </a:prstGeom>
+          <a:noFill/>
+          <a:ln w="28575">
+            <a:solidFill>
+              <a:schemeClr val="tx2">
+                <a:lumMod val="75000"/>
+              </a:schemeClr>
+            </a:solidFill>
+            <a:miter lim="800000"/>
+            <a:headEnd/>
+            <a:tailEnd/>
+          </a:ln>
+          <a:effectLst/>
+          <a:extLst>
+            <a:ext uri="{909E8E84-426E-40DD-AFC4-6F175D3DCCD1}">
+              <a14:hiddenFill xmlns:a14="http://schemas.microsoft.com/office/drawing/2010/main">
+                <a:solidFill>
+                  <a:schemeClr val="accent1"/>
+                </a:solidFill>
+              </a14:hiddenFill>
+            </a:ext>
+            <a:ext uri="{AF507438-7753-43E0-B8FC-AC1667EBCBE1}">
+              <a14:hiddenEffects xmlns:a14="http://schemas.microsoft.com/office/drawing/2010/main">
+                <a:effectLst>
+                  <a:outerShdw dist="35921" dir="2700000" algn="ctr" rotWithShape="0">
+                    <a:schemeClr val="bg2"/>
+                  </a:outerShdw>
+                </a:effectLst>
+              </a14:hiddenEffects>
+            </a:ext>
+          </a:extLst>
+        </p:spPr>
+      </p:pic>
     </p:spTree>
     <p:extLst>
       <p:ext uri="{BB962C8B-B14F-4D97-AF65-F5344CB8AC3E}">
-        <p14:creationId xmlns:p14="http://schemas.microsoft.com/office/powerpoint/2010/main" xmlns="" val="272175433"/>
+        <p14:creationId xmlns:p14="http://schemas.microsoft.com/office/powerpoint/2010/main" val="272175433"/>
       </p:ext>
     </p:extLst>
   </p:cSld>
@@ -4981,10 +5249,10 @@
           </p:nvPr>
         </p:nvPicPr>
         <p:blipFill>
-          <a:blip r:embed="rId2" cstate="print">
+          <a:blip r:embed="rId2" cstate="email">
             <a:extLst>
               <a:ext uri="{28A0092B-C50C-407E-A947-70E740481C1C}">
-                <a14:useLocalDpi xmlns:a14="http://schemas.microsoft.com/office/drawing/2010/main" xmlns="" val="0"/>
+                <a14:useLocalDpi xmlns:a14="http://schemas.microsoft.com/office/drawing/2010/main" val="0"/>
               </a:ext>
             </a:extLst>
           </a:blip>
@@ -5009,10 +5277,10 @@
           <p:nvPr/>
         </p:nvPicPr>
         <p:blipFill>
-          <a:blip r:embed="rId3" cstate="print">
+          <a:blip r:embed="rId3" cstate="email">
             <a:extLst>
               <a:ext uri="{28A0092B-C50C-407E-A947-70E740481C1C}">
-                <a14:useLocalDpi xmlns:a14="http://schemas.microsoft.com/office/drawing/2010/main" xmlns="" val="0"/>
+                <a14:useLocalDpi xmlns:a14="http://schemas.microsoft.com/office/drawing/2010/main" val="0"/>
               </a:ext>
             </a:extLst>
           </a:blip>
@@ -5033,7 +5301,7 @@
     </p:spTree>
     <p:extLst>
       <p:ext uri="{BB962C8B-B14F-4D97-AF65-F5344CB8AC3E}">
-        <p14:creationId xmlns:p14="http://schemas.microsoft.com/office/powerpoint/2010/main" xmlns="" val="1944621934"/>
+        <p14:creationId xmlns:p14="http://schemas.microsoft.com/office/powerpoint/2010/main" val="1944621934"/>
       </p:ext>
     </p:extLst>
   </p:cSld>

</xml_diff>

<commit_message>
Made my changes to the powerpoint presentation Added: -Excel slide --Placed after algorithm slides
</commit_message>
<xml_diff>
--- a/doc/winter_quarter_presentation.pptx
+++ b/doc/winter_quarter_presentation.pptx
@@ -5,7 +5,7 @@
     <p:sldMasterId id="2147484728" r:id="rId1"/>
   </p:sldMasterIdLst>
   <p:notesMasterIdLst>
-    <p:notesMasterId r:id="rId10"/>
+    <p:notesMasterId r:id="rId11"/>
   </p:notesMasterIdLst>
   <p:sldIdLst>
     <p:sldId id="256" r:id="rId2"/>
@@ -15,7 +15,8 @@
     <p:sldId id="258" r:id="rId6"/>
     <p:sldId id="261" r:id="rId7"/>
     <p:sldId id="262" r:id="rId8"/>
-    <p:sldId id="263" r:id="rId9"/>
+    <p:sldId id="264" r:id="rId9"/>
+    <p:sldId id="263" r:id="rId10"/>
   </p:sldIdLst>
   <p:sldSz cx="9144000" cy="6858000" type="screen4x3"/>
   <p:notesSz cx="6858000" cy="9144000"/>
@@ -200,7 +201,7 @@
             <a:fld id="{132F18A9-51DA-6A43-BB36-FA5764556C53}" type="datetimeFigureOut">
               <a:rPr lang="en-US" smtClean="0"/>
               <a:pPr/>
-              <a:t>1/11/2012</a:t>
+              <a:t>1/11/12</a:t>
             </a:fld>
             <a:endParaRPr lang="en-US"/>
           </a:p>
@@ -893,6 +894,159 @@
 </p:notes>
 </file>
 
+<file path=ppt/notesSlides/notesSlide5.xml><?xml version="1.0" encoding="utf-8"?>
+<p:notes xmlns:a="http://schemas.openxmlformats.org/drawingml/2006/main" xmlns:r="http://schemas.openxmlformats.org/officeDocument/2006/relationships" xmlns:p="http://schemas.openxmlformats.org/presentationml/2006/main">
+  <p:cSld>
+    <p:spTree>
+      <p:nvGrpSpPr>
+        <p:cNvPr id="1" name=""/>
+        <p:cNvGrpSpPr/>
+        <p:nvPr/>
+      </p:nvGrpSpPr>
+      <p:grpSpPr>
+        <a:xfrm>
+          <a:off x="0" y="0"/>
+          <a:ext cx="0" cy="0"/>
+          <a:chOff x="0" y="0"/>
+          <a:chExt cx="0" cy="0"/>
+        </a:xfrm>
+      </p:grpSpPr>
+      <p:sp>
+        <p:nvSpPr>
+          <p:cNvPr id="2" name="Slide Image Placeholder 1"/>
+          <p:cNvSpPr>
+            <a:spLocks noGrp="1" noRot="1" noChangeAspect="1"/>
+          </p:cNvSpPr>
+          <p:nvPr>
+            <p:ph type="sldImg"/>
+          </p:nvPr>
+        </p:nvSpPr>
+        <p:spPr/>
+      </p:sp>
+      <p:sp>
+        <p:nvSpPr>
+          <p:cNvPr id="3" name="Notes Placeholder 2"/>
+          <p:cNvSpPr>
+            <a:spLocks noGrp="1"/>
+          </p:cNvSpPr>
+          <p:nvPr>
+            <p:ph type="body" idx="1"/>
+          </p:nvPr>
+        </p:nvSpPr>
+        <p:spPr/>
+        <p:txBody>
+          <a:bodyPr/>
+          <a:lstStyle/>
+          <a:p>
+            <a:r>
+              <a:rPr lang="en-US" dirty="0" smtClean="0"/>
+              <a:t>Report would</a:t>
+            </a:r>
+            <a:r>
+              <a:rPr lang="en-US" baseline="0" dirty="0" smtClean="0"/>
+              <a:t> be attached to e-mail</a:t>
+            </a:r>
+          </a:p>
+          <a:p>
+            <a:r>
+              <a:rPr lang="en-US" baseline="0" dirty="0" smtClean="0"/>
+              <a:t>	if separate image, would be attached to same message</a:t>
+            </a:r>
+          </a:p>
+          <a:p>
+            <a:endParaRPr lang="en-US" baseline="0" dirty="0" smtClean="0"/>
+          </a:p>
+          <a:p>
+            <a:r>
+              <a:rPr lang="en-US" baseline="0" dirty="0" smtClean="0"/>
+              <a:t>CSV also an option, but doesn’t allow for formatting</a:t>
+            </a:r>
+          </a:p>
+          <a:p>
+            <a:endParaRPr lang="en-US" baseline="0" dirty="0" smtClean="0"/>
+          </a:p>
+          <a:p>
+            <a:r>
+              <a:rPr lang="en-US" baseline="0" dirty="0" smtClean="0"/>
+              <a:t>Not sure what version of Excel client would be using</a:t>
+            </a:r>
+          </a:p>
+          <a:p>
+            <a:r>
+              <a:rPr lang="en-US" baseline="0" dirty="0" smtClean="0"/>
+              <a:t>	.</a:t>
+            </a:r>
+            <a:r>
+              <a:rPr lang="en-US" baseline="0" dirty="0" err="1" smtClean="0"/>
+              <a:t>xls</a:t>
+            </a:r>
+            <a:r>
+              <a:rPr lang="en-US" baseline="0" dirty="0" smtClean="0"/>
+              <a:t> and Office XML have been supported for a while</a:t>
+            </a:r>
+          </a:p>
+          <a:p>
+            <a:r>
+              <a:rPr lang="en-US" baseline="0" dirty="0" smtClean="0"/>
+              <a:t>	Should probably avoid .</a:t>
+            </a:r>
+            <a:r>
+              <a:rPr lang="en-US" baseline="0" dirty="0" err="1" smtClean="0"/>
+              <a:t>xlsx</a:t>
+            </a:r>
+            <a:r>
+              <a:rPr lang="en-US" baseline="0" dirty="0" smtClean="0"/>
+              <a:t> (2007 </a:t>
+            </a:r>
+            <a:r>
+              <a:rPr lang="en-US" baseline="0" smtClean="0"/>
+              <a:t>and above </a:t>
+            </a:r>
+            <a:r>
+              <a:rPr lang="en-US" baseline="0" dirty="0" smtClean="0"/>
+              <a:t>format)</a:t>
+            </a:r>
+            <a:endParaRPr lang="en-US" dirty="0"/>
+          </a:p>
+        </p:txBody>
+      </p:sp>
+      <p:sp>
+        <p:nvSpPr>
+          <p:cNvPr id="4" name="Slide Number Placeholder 3"/>
+          <p:cNvSpPr>
+            <a:spLocks noGrp="1"/>
+          </p:cNvSpPr>
+          <p:nvPr>
+            <p:ph type="sldNum" sz="quarter" idx="10"/>
+          </p:nvPr>
+        </p:nvSpPr>
+        <p:spPr/>
+        <p:txBody>
+          <a:bodyPr/>
+          <a:lstStyle/>
+          <a:p>
+            <a:fld id="{4B63FCE5-717F-3B46-A69D-B8B1230B7F2F}" type="slidenum">
+              <a:rPr lang="en-US" smtClean="0"/>
+              <a:pPr/>
+              <a:t>8</a:t>
+            </a:fld>
+            <a:endParaRPr lang="en-US"/>
+          </a:p>
+        </p:txBody>
+      </p:sp>
+    </p:spTree>
+    <p:extLst>
+      <p:ext uri="{BB962C8B-B14F-4D97-AF65-F5344CB8AC3E}">
+        <p14:creationId xmlns:p14="http://schemas.microsoft.com/office/powerpoint/2010/main" val="3399712429"/>
+      </p:ext>
+    </p:extLst>
+  </p:cSld>
+  <p:clrMapOvr>
+    <a:masterClrMapping/>
+  </p:clrMapOvr>
+</p:notes>
+</file>
+
 <file path=ppt/slideLayouts/slideLayout1.xml><?xml version="1.0" encoding="utf-8"?>
 <p:sldLayout xmlns:a="http://schemas.openxmlformats.org/drawingml/2006/main" xmlns:r="http://schemas.openxmlformats.org/officeDocument/2006/relationships" xmlns:p="http://schemas.openxmlformats.org/presentationml/2006/main" showMasterSp="0" type="title" preserve="1">
   <p:cSld name="Title Slide">
@@ -953,7 +1107,7 @@
             <a:fld id="{2233D26B-DFC2-4248-8ED0-AD3E108CBDD7}" type="datetime1">
               <a:rPr lang="en-US" smtClean="0"/>
               <a:pPr/>
-              <a:t>1/11/2012</a:t>
+              <a:t>1/11/12</a:t>
             </a:fld>
             <a:endParaRPr lang="en-US" dirty="0"/>
           </a:p>
@@ -1271,7 +1425,7 @@
             <a:fld id="{E694C003-38E8-486A-9BFD-47E55D87241C}" type="datetime1">
               <a:rPr lang="en-US" smtClean="0"/>
               <a:pPr/>
-              <a:t>1/11/2012</a:t>
+              <a:t>1/11/12</a:t>
             </a:fld>
             <a:endParaRPr lang="en-US" dirty="0"/>
           </a:p>
@@ -1448,7 +1602,7 @@
             <a:fld id="{E059EAA3-934B-41DB-B3B1-806F4BE5CC37}" type="datetime1">
               <a:rPr lang="en-US" smtClean="0"/>
               <a:pPr/>
-              <a:t>1/11/2012</a:t>
+              <a:t>1/11/12</a:t>
             </a:fld>
             <a:endParaRPr lang="en-US" dirty="0"/>
           </a:p>
@@ -1568,7 +1722,7 @@
             <a:fld id="{8F97F932-D99A-4087-BFB1-EA42FAFC8D2C}" type="datetime1">
               <a:rPr lang="en-US" smtClean="0"/>
               <a:pPr/>
-              <a:t>1/11/2012</a:t>
+              <a:t>1/11/12</a:t>
             </a:fld>
             <a:endParaRPr lang="en-US" dirty="0"/>
           </a:p>
@@ -1868,7 +2022,7 @@
             <a:fld id="{79C96367-2F2B-4F6E-ACF4-15FA13738E10}" type="datetime1">
               <a:rPr lang="en-US" smtClean="0"/>
               <a:pPr/>
-              <a:t>1/11/2012</a:t>
+              <a:t>1/11/12</a:t>
             </a:fld>
             <a:endParaRPr lang="en-US" dirty="0"/>
           </a:p>
@@ -2163,7 +2317,7 @@
             <a:fld id="{8FB3498D-21C7-408B-8EF5-5B55DEF0BFD5}" type="datetime1">
               <a:rPr lang="en-US" smtClean="0"/>
               <a:pPr/>
-              <a:t>1/11/2012</a:t>
+              <a:t>1/11/12</a:t>
             </a:fld>
             <a:endParaRPr lang="en-US" dirty="0"/>
           </a:p>
@@ -2593,7 +2747,7 @@
             <a:fld id="{84DB246E-8FD1-42FF-94A4-E4133095C37A}" type="datetime1">
               <a:rPr lang="en-US" smtClean="0"/>
               <a:pPr/>
-              <a:t>1/11/2012</a:t>
+              <a:t>1/11/12</a:t>
             </a:fld>
             <a:endParaRPr lang="en-US" dirty="0"/>
           </a:p>
@@ -2713,7 +2867,7 @@
             <a:fld id="{A93939D4-B818-4372-B1EE-7CB6D5BBC74A}" type="datetime1">
               <a:rPr lang="en-US" smtClean="0"/>
               <a:pPr/>
-              <a:t>1/11/2012</a:t>
+              <a:t>1/11/12</a:t>
             </a:fld>
             <a:endParaRPr lang="en-US" dirty="0"/>
           </a:p>
@@ -2805,7 +2959,7 @@
             <a:fld id="{2F35E438-4D0D-4834-B658-A90420491D98}" type="datetime1">
               <a:rPr lang="en-US" smtClean="0"/>
               <a:pPr/>
-              <a:t>1/11/2012</a:t>
+              <a:t>1/11/12</a:t>
             </a:fld>
             <a:endParaRPr lang="en-US" dirty="0"/>
           </a:p>
@@ -3057,7 +3211,7 @@
             <a:fld id="{76F8ADFA-7142-4015-85E6-1712F15FA709}" type="datetime1">
               <a:rPr lang="en-US" smtClean="0"/>
               <a:pPr/>
-              <a:t>1/11/2012</a:t>
+              <a:t>1/11/12</a:t>
             </a:fld>
             <a:endParaRPr lang="en-US" dirty="0"/>
           </a:p>
@@ -3575,7 +3729,7 @@
             <a:fld id="{34A581E0-D653-4D78-A48F-41D80498BC7E}" type="datetime1">
               <a:rPr lang="en-US" smtClean="0"/>
               <a:pPr/>
-              <a:t>1/11/2012</a:t>
+              <a:t>1/11/12</a:t>
             </a:fld>
             <a:endParaRPr lang="en-US" dirty="0"/>
           </a:p>
@@ -3807,7 +3961,7 @@
             <a:fld id="{8B3AFFF1-9C47-49F0-AE12-AF188F3F4E82}" type="datetime1">
               <a:rPr lang="en-US" smtClean="0"/>
               <a:pPr/>
-              <a:t>1/11/2012</a:t>
+              <a:t>1/11/12</a:t>
             </a:fld>
             <a:endParaRPr lang="en-US" dirty="0"/>
           </a:p>
@@ -4370,7 +4524,7 @@
   <p:timing>
     <p:tnLst>
       <p:par>
-        <p:cTn id="1" dur="indefinite" restart="never" nodeType="tmRoot"/>
+        <p:cTn xmlns:p14="http://schemas.microsoft.com/office/powerpoint/2010/main" id="1" dur="indefinite" restart="never" nodeType="tmRoot"/>
       </p:par>
     </p:tnLst>
   </p:timing>
@@ -4492,7 +4646,7 @@
   <p:timing>
     <p:tnLst>
       <p:par>
-        <p:cTn id="1" dur="indefinite" restart="never" nodeType="tmRoot"/>
+        <p:cTn xmlns:p14="http://schemas.microsoft.com/office/powerpoint/2010/main" id="1" dur="indefinite" restart="never" nodeType="tmRoot"/>
       </p:par>
     </p:tnLst>
   </p:timing>
@@ -4591,7 +4745,7 @@
   <p:timing>
     <p:tnLst>
       <p:par>
-        <p:cTn id="1" dur="indefinite" restart="never" nodeType="tmRoot"/>
+        <p:cTn xmlns:p14="http://schemas.microsoft.com/office/powerpoint/2010/main" id="1" dur="indefinite" restart="never" nodeType="tmRoot"/>
       </p:par>
     </p:tnLst>
   </p:timing>
@@ -4738,7 +4892,7 @@
   <p:timing>
     <p:tnLst>
       <p:par>
-        <p:cTn id="1" dur="indefinite" restart="never" nodeType="tmRoot"/>
+        <p:cTn xmlns:p14="http://schemas.microsoft.com/office/powerpoint/2010/main" id="1" dur="indefinite" restart="never" nodeType="tmRoot"/>
       </p:par>
     </p:tnLst>
   </p:timing>
@@ -4834,7 +4988,7 @@
   <p:timing>
     <p:tnLst>
       <p:par>
-        <p:cTn id="1" dur="indefinite" restart="never" nodeType="tmRoot"/>
+        <p:cTn xmlns:p14="http://schemas.microsoft.com/office/powerpoint/2010/main" id="1" dur="indefinite" restart="never" nodeType="tmRoot"/>
       </p:par>
     </p:tnLst>
   </p:timing>
@@ -4996,7 +5150,7 @@
   <p:timing>
     <p:tnLst>
       <p:par>
-        <p:cTn id="1" dur="indefinite" restart="never" nodeType="tmRoot"/>
+        <p:cTn xmlns:p14="http://schemas.microsoft.com/office/powerpoint/2010/main" id="1" dur="indefinite" restart="never" nodeType="tmRoot"/>
       </p:par>
     </p:tnLst>
   </p:timing>
@@ -5153,14 +5307,14 @@
           </a:ln>
           <a:effectLst/>
           <a:extLst>
-            <a:ext uri="{909E8E84-426E-40DD-AFC4-6F175D3DCCD1}">
+            <a:ext uri="{909E8E84-426E-40dd-AFC4-6F175D3DCCD1}">
               <a14:hiddenFill xmlns:a14="http://schemas.microsoft.com/office/drawing/2010/main">
                 <a:solidFill>
                   <a:schemeClr val="accent1"/>
                 </a:solidFill>
               </a14:hiddenFill>
             </a:ext>
-            <a:ext uri="{AF507438-7753-43E0-B8FC-AC1667EBCBE1}">
+            <a:ext uri="{AF507438-7753-43e0-B8FC-AC1667EBCBE1}">
               <a14:hiddenEffects xmlns:a14="http://schemas.microsoft.com/office/drawing/2010/main">
                 <a:effectLst>
                   <a:outerShdw dist="35921" dir="2700000" algn="ctr" rotWithShape="0">
@@ -5185,7 +5339,7 @@
   <p:timing>
     <p:tnLst>
       <p:par>
-        <p:cTn id="1" dur="indefinite" restart="never" nodeType="tmRoot"/>
+        <p:cTn xmlns:p14="http://schemas.microsoft.com/office/powerpoint/2010/main" id="1" dur="indefinite" restart="never" nodeType="tmRoot"/>
       </p:par>
     </p:tnLst>
   </p:timing>
@@ -5193,6 +5347,153 @@
 </file>
 
 <file path=ppt/slides/slide8.xml><?xml version="1.0" encoding="utf-8"?>
+<p:sld xmlns:a="http://schemas.openxmlformats.org/drawingml/2006/main" xmlns:r="http://schemas.openxmlformats.org/officeDocument/2006/relationships" xmlns:p="http://schemas.openxmlformats.org/presentationml/2006/main">
+  <p:cSld>
+    <p:spTree>
+      <p:nvGrpSpPr>
+        <p:cNvPr id="1" name=""/>
+        <p:cNvGrpSpPr/>
+        <p:nvPr/>
+      </p:nvGrpSpPr>
+      <p:grpSpPr>
+        <a:xfrm>
+          <a:off x="0" y="0"/>
+          <a:ext cx="0" cy="0"/>
+          <a:chOff x="0" y="0"/>
+          <a:chExt cx="0" cy="0"/>
+        </a:xfrm>
+      </p:grpSpPr>
+      <p:sp>
+        <p:nvSpPr>
+          <p:cNvPr id="2" name="Title 1"/>
+          <p:cNvSpPr>
+            <a:spLocks noGrp="1"/>
+          </p:cNvSpPr>
+          <p:nvPr>
+            <p:ph type="title"/>
+          </p:nvPr>
+        </p:nvSpPr>
+        <p:spPr/>
+        <p:txBody>
+          <a:bodyPr/>
+          <a:lstStyle/>
+          <a:p>
+            <a:pPr algn="ctr"/>
+            <a:r>
+              <a:rPr lang="en-US" cap="none" dirty="0" smtClean="0"/>
+              <a:t>Exporting to Excel</a:t>
+            </a:r>
+            <a:endParaRPr lang="en-US" cap="none" dirty="0"/>
+          </a:p>
+        </p:txBody>
+      </p:sp>
+      <p:sp>
+        <p:nvSpPr>
+          <p:cNvPr id="3" name="Content Placeholder 2"/>
+          <p:cNvSpPr>
+            <a:spLocks noGrp="1"/>
+          </p:cNvSpPr>
+          <p:nvPr>
+            <p:ph sz="quarter" idx="13"/>
+          </p:nvPr>
+        </p:nvSpPr>
+        <p:spPr/>
+        <p:txBody>
+          <a:bodyPr/>
+          <a:lstStyle/>
+          <a:p>
+            <a:r>
+              <a:rPr lang="en-US" dirty="0" smtClean="0"/>
+              <a:t>Client wants to be able to view a report in Excel</a:t>
+            </a:r>
+          </a:p>
+          <a:p>
+            <a:pPr lvl="1"/>
+            <a:r>
+              <a:rPr lang="en-US" dirty="0" smtClean="0"/>
+              <a:t>Would prefer embedded target image, but is flexible</a:t>
+            </a:r>
+          </a:p>
+          <a:p>
+            <a:r>
+              <a:rPr lang="en-US" dirty="0" smtClean="0"/>
+              <a:t>Currently looking at 2 possibilities</a:t>
+            </a:r>
+          </a:p>
+          <a:p>
+            <a:pPr lvl="1"/>
+            <a:r>
+              <a:rPr lang="en-US" dirty="0" smtClean="0"/>
+              <a:t>.</a:t>
+            </a:r>
+            <a:r>
+              <a:rPr lang="en-US" dirty="0" err="1" smtClean="0"/>
+              <a:t>xls</a:t>
+            </a:r>
+            <a:r>
+              <a:rPr lang="en-US" dirty="0" smtClean="0"/>
+              <a:t> binary format (Excel 2003 and below)</a:t>
+            </a:r>
+          </a:p>
+          <a:p>
+            <a:pPr lvl="2"/>
+            <a:r>
+              <a:rPr lang="en-US" dirty="0" smtClean="0"/>
+              <a:t>Still looking for a viable library</a:t>
+            </a:r>
+          </a:p>
+          <a:p>
+            <a:pPr lvl="2"/>
+            <a:r>
+              <a:rPr lang="en-US" dirty="0" smtClean="0"/>
+              <a:t>May allow for embedding of image</a:t>
+            </a:r>
+          </a:p>
+          <a:p>
+            <a:pPr lvl="1"/>
+            <a:r>
+              <a:rPr lang="en-US" dirty="0" smtClean="0"/>
+              <a:t>Office XML format</a:t>
+            </a:r>
+          </a:p>
+          <a:p>
+            <a:pPr lvl="2"/>
+            <a:r>
+              <a:rPr lang="en-US" dirty="0" smtClean="0"/>
+              <a:t>Cannot embed image</a:t>
+            </a:r>
+          </a:p>
+          <a:p>
+            <a:pPr lvl="2"/>
+            <a:r>
+              <a:rPr lang="en-US" dirty="0" smtClean="0"/>
+              <a:t>Can be created using plain text</a:t>
+            </a:r>
+          </a:p>
+          <a:p>
+            <a:pPr lvl="3"/>
+            <a:r>
+              <a:rPr lang="en-US" dirty="0" smtClean="0"/>
+              <a:t>No library needed</a:t>
+            </a:r>
+            <a:endParaRPr lang="en-US" dirty="0"/>
+          </a:p>
+        </p:txBody>
+      </p:sp>
+    </p:spTree>
+    <p:extLst>
+      <p:ext uri="{BB962C8B-B14F-4D97-AF65-F5344CB8AC3E}">
+        <p14:creationId xmlns:p14="http://schemas.microsoft.com/office/powerpoint/2010/main" val="2315570981"/>
+      </p:ext>
+    </p:extLst>
+  </p:cSld>
+  <p:clrMapOvr>
+    <a:masterClrMapping/>
+  </p:clrMapOvr>
+</p:sld>
+</file>
+
+<file path=ppt/slides/slide9.xml><?xml version="1.0" encoding="utf-8"?>
 <p:sld xmlns:a="http://schemas.openxmlformats.org/drawingml/2006/main" xmlns:r="http://schemas.openxmlformats.org/officeDocument/2006/relationships" xmlns:p="http://schemas.openxmlformats.org/presentationml/2006/main">
   <p:cSld>
     <p:spTree>
@@ -5311,7 +5612,7 @@
   <p:timing>
     <p:tnLst>
       <p:par>
-        <p:cTn id="1" dur="indefinite" restart="never" nodeType="tmRoot"/>
+        <p:cTn xmlns:p14="http://schemas.microsoft.com/office/powerpoint/2010/main" id="1" dur="indefinite" restart="never" nodeType="tmRoot"/>
       </p:par>
     </p:tnLst>
   </p:timing>

</xml_diff>